<commit_message>
Update OAS: consolidate callbacks, consolidate services Fixes #1211
</commit_message>
<xml_diff>
--- a/spec/additionalDescription/pictures/MetadataPics.pptx
+++ b/spec/additionalDescription/pictures/MetadataPics.pptx
@@ -13061,7 +13061,7 @@
         </p:nvCxnSpPr>
         <p:spPr>
           <a:xfrm flipV="1">
-            <a:off x="758313" y="1560871"/>
+            <a:off x="1092037" y="1560871"/>
             <a:ext cx="0" cy="542439"/>
           </a:xfrm>
           <a:prstGeom prst="line">
@@ -13098,7 +13098,7 @@
         <p:spPr>
           <a:xfrm>
             <a:off x="89804" y="1125079"/>
-            <a:ext cx="996334" cy="461665"/>
+            <a:ext cx="1520608" cy="461665"/>
           </a:xfrm>
           <a:prstGeom prst="rect">
             <a:avLst/>
@@ -13120,49 +13120,11 @@
                   </a:schemeClr>
                 </a:solidFill>
               </a:rPr>
-              <a:t>select A for update</a:t>
+              <a:t>already selected for update:  A, B</a:t>
             </a:r>
           </a:p>
         </p:txBody>
       </p:sp>
-      <p:cxnSp>
-        <p:nvCxnSpPr>
-          <p:cNvPr id="14" name="Gerader Verbinder 13">
-            <a:extLst>
-              <a:ext uri="{FF2B5EF4-FFF2-40B4-BE49-F238E27FC236}">
-                <a16:creationId xmlns:a16="http://schemas.microsoft.com/office/drawing/2014/main" id="{7D7F2FFE-3A94-B2F2-9E02-732EF7A78F9B}"/>
-              </a:ext>
-            </a:extLst>
-          </p:cNvPr>
-          <p:cNvCxnSpPr>
-            <a:cxnSpLocks/>
-          </p:cNvCxnSpPr>
-          <p:nvPr/>
-        </p:nvCxnSpPr>
-        <p:spPr>
-          <a:xfrm>
-            <a:off x="758313" y="1977838"/>
-            <a:ext cx="0" cy="125472"/>
-          </a:xfrm>
-          <a:prstGeom prst="line">
-            <a:avLst/>
-          </a:prstGeom>
-        </p:spPr>
-        <p:style>
-          <a:lnRef idx="2">
-            <a:schemeClr val="accent1"/>
-          </a:lnRef>
-          <a:fillRef idx="0">
-            <a:schemeClr val="accent1"/>
-          </a:fillRef>
-          <a:effectRef idx="1">
-            <a:schemeClr val="accent1"/>
-          </a:effectRef>
-          <a:fontRef idx="minor">
-            <a:schemeClr val="tx1"/>
-          </a:fontRef>
-        </p:style>
-      </p:cxnSp>
       <p:sp>
         <p:nvSpPr>
           <p:cNvPr id="15" name="Textfeld 14">
@@ -13177,8 +13139,8 @@
         </p:nvSpPr>
         <p:spPr>
           <a:xfrm>
-            <a:off x="84506" y="3236179"/>
-            <a:ext cx="996334" cy="276999"/>
+            <a:off x="90398" y="3216656"/>
+            <a:ext cx="1581143" cy="276999"/>
           </a:xfrm>
           <a:prstGeom prst="rect">
             <a:avLst/>
@@ -13200,84 +13162,7 @@
                   </a:schemeClr>
                 </a:solidFill>
               </a:rPr>
-              <a:t>select C</a:t>
-            </a:r>
-          </a:p>
-        </p:txBody>
-      </p:sp>
-      <p:cxnSp>
-        <p:nvCxnSpPr>
-          <p:cNvPr id="16" name="Gerader Verbinder 15">
-            <a:extLst>
-              <a:ext uri="{FF2B5EF4-FFF2-40B4-BE49-F238E27FC236}">
-                <a16:creationId xmlns:a16="http://schemas.microsoft.com/office/drawing/2014/main" id="{4EB74AE1-1C8E-EF78-3F43-9BD9318CD2D6}"/>
-              </a:ext>
-            </a:extLst>
-          </p:cNvPr>
-          <p:cNvCxnSpPr/>
-          <p:nvPr/>
-        </p:nvCxnSpPr>
-        <p:spPr>
-          <a:xfrm flipV="1">
-            <a:off x="1343333" y="1560870"/>
-            <a:ext cx="0" cy="542439"/>
-          </a:xfrm>
-          <a:prstGeom prst="line">
-            <a:avLst/>
-          </a:prstGeom>
-        </p:spPr>
-        <p:style>
-          <a:lnRef idx="2">
-            <a:schemeClr val="accent1"/>
-          </a:lnRef>
-          <a:fillRef idx="0">
-            <a:schemeClr val="accent1"/>
-          </a:fillRef>
-          <a:effectRef idx="1">
-            <a:schemeClr val="accent1"/>
-          </a:effectRef>
-          <a:fontRef idx="minor">
-            <a:schemeClr val="tx1"/>
-          </a:fontRef>
-        </p:style>
-      </p:cxnSp>
-      <p:sp>
-        <p:nvSpPr>
-          <p:cNvPr id="17" name="Textfeld 16">
-            <a:extLst>
-              <a:ext uri="{FF2B5EF4-FFF2-40B4-BE49-F238E27FC236}">
-                <a16:creationId xmlns:a16="http://schemas.microsoft.com/office/drawing/2014/main" id="{F75C9D51-DA48-6BBB-0A50-458441DD9AEE}"/>
-              </a:ext>
-            </a:extLst>
-          </p:cNvPr>
-          <p:cNvSpPr txBox="1"/>
-          <p:nvPr/>
-        </p:nvSpPr>
-        <p:spPr>
-          <a:xfrm>
-            <a:off x="1066083" y="1229263"/>
-            <a:ext cx="821708" cy="276999"/>
-          </a:xfrm>
-          <a:prstGeom prst="rect">
-            <a:avLst/>
-          </a:prstGeom>
-          <a:noFill/>
-        </p:spPr>
-        <p:txBody>
-          <a:bodyPr wrap="square" rtlCol="0">
-            <a:spAutoFit/>
-          </a:bodyPr>
-          <a:lstStyle/>
-          <a:p>
-            <a:r>
-              <a:rPr lang="de-DE" sz="1200">
-                <a:solidFill>
-                  <a:schemeClr val="accent4">
-                    <a:lumMod val="50000"/>
-                  </a:schemeClr>
-                </a:solidFill>
-              </a:rPr>
-              <a:t>select B</a:t>
+              <a:t>already selected: C</a:t>
             </a:r>
           </a:p>
         </p:txBody>
@@ -13298,7 +13183,7 @@
         </p:nvCxnSpPr>
         <p:spPr>
           <a:xfrm>
-            <a:off x="788380" y="2697050"/>
+            <a:off x="1122104" y="2697050"/>
             <a:ext cx="0" cy="577971"/>
           </a:xfrm>
           <a:prstGeom prst="line">
@@ -14953,74 +14838,7 @@
         </p:nvSpPr>
         <p:spPr>
           <a:xfrm>
-            <a:off x="678436" y="2068124"/>
-            <a:ext cx="166256" cy="639514"/>
-          </a:xfrm>
-          <a:prstGeom prst="rect">
-            <a:avLst/>
-          </a:prstGeom>
-          <a:solidFill>
-            <a:schemeClr val="tx1">
-              <a:lumMod val="65000"/>
-              <a:lumOff val="35000"/>
-            </a:schemeClr>
-          </a:solidFill>
-          <a:ln w="9525">
-            <a:solidFill>
-              <a:schemeClr val="tx1">
-                <a:lumMod val="85000"/>
-                <a:lumOff val="15000"/>
-              </a:schemeClr>
-            </a:solidFill>
-          </a:ln>
-        </p:spPr>
-        <p:style>
-          <a:lnRef idx="2">
-            <a:schemeClr val="accent1">
-              <a:shade val="15000"/>
-            </a:schemeClr>
-          </a:lnRef>
-          <a:fillRef idx="1">
-            <a:schemeClr val="accent1"/>
-          </a:fillRef>
-          <a:effectRef idx="0">
-            <a:schemeClr val="accent1"/>
-          </a:effectRef>
-          <a:fontRef idx="minor">
-            <a:schemeClr val="lt1"/>
-          </a:fontRef>
-        </p:style>
-        <p:txBody>
-          <a:bodyPr rtlCol="0" anchor="ctr"/>
-          <a:lstStyle/>
-          <a:p>
-            <a:pPr algn="ctr"/>
-            <a:endParaRPr lang="de-DE" sz="1000" i="1">
-              <a:solidFill>
-                <a:schemeClr val="accent6">
-                  <a:lumMod val="40000"/>
-                  <a:lumOff val="60000"/>
-                </a:schemeClr>
-              </a:solidFill>
-            </a:endParaRPr>
-          </a:p>
-        </p:txBody>
-      </p:sp>
-      <p:sp>
-        <p:nvSpPr>
-          <p:cNvPr id="91" name="Rechteck 90">
-            <a:extLst>
-              <a:ext uri="{FF2B5EF4-FFF2-40B4-BE49-F238E27FC236}">
-                <a16:creationId xmlns:a16="http://schemas.microsoft.com/office/drawing/2014/main" id="{CE55FE21-B259-AB9A-772B-56711A020E15}"/>
-              </a:ext>
-            </a:extLst>
-          </p:cNvPr>
-          <p:cNvSpPr/>
-          <p:nvPr/>
-        </p:nvSpPr>
-        <p:spPr>
-          <a:xfrm>
-            <a:off x="1287063" y="2068124"/>
+            <a:off x="1012160" y="2068124"/>
             <a:ext cx="166256" cy="639514"/>
           </a:xfrm>
           <a:prstGeom prst="rect">
@@ -15513,6 +15331,68 @@
           </a:fontRef>
         </p:style>
       </p:cxnSp>
+      <p:sp>
+        <p:nvSpPr>
+          <p:cNvPr id="5" name="Pfeil: nach rechts 4">
+            <a:extLst>
+              <a:ext uri="{FF2B5EF4-FFF2-40B4-BE49-F238E27FC236}">
+                <a16:creationId xmlns:a16="http://schemas.microsoft.com/office/drawing/2014/main" id="{9997CCE8-BE2D-57CC-70EF-FBA1BB9A0AED}"/>
+              </a:ext>
+            </a:extLst>
+          </p:cNvPr>
+          <p:cNvSpPr/>
+          <p:nvPr/>
+        </p:nvSpPr>
+        <p:spPr>
+          <a:xfrm>
+            <a:off x="213494" y="1948760"/>
+            <a:ext cx="609260" cy="869803"/>
+          </a:xfrm>
+          <a:prstGeom prst="rightArrow">
+            <a:avLst>
+              <a:gd name="adj1" fmla="val 50000"/>
+              <a:gd name="adj2" fmla="val 80348"/>
+            </a:avLst>
+          </a:prstGeom>
+          <a:solidFill>
+            <a:schemeClr val="bg1">
+              <a:lumMod val="75000"/>
+            </a:schemeClr>
+          </a:solidFill>
+          <a:ln w="9525">
+            <a:solidFill>
+              <a:schemeClr val="tx1">
+                <a:lumMod val="75000"/>
+                <a:lumOff val="25000"/>
+              </a:schemeClr>
+            </a:solidFill>
+          </a:ln>
+        </p:spPr>
+        <p:style>
+          <a:lnRef idx="2">
+            <a:schemeClr val="accent1">
+              <a:shade val="15000"/>
+            </a:schemeClr>
+          </a:lnRef>
+          <a:fillRef idx="1">
+            <a:schemeClr val="accent1"/>
+          </a:fillRef>
+          <a:effectRef idx="0">
+            <a:schemeClr val="accent1"/>
+          </a:effectRef>
+          <a:fontRef idx="minor">
+            <a:schemeClr val="lt1"/>
+          </a:fontRef>
+        </p:style>
+        <p:txBody>
+          <a:bodyPr rtlCol="0" anchor="ctr"/>
+          <a:lstStyle/>
+          <a:p>
+            <a:pPr algn="ctr"/>
+            <a:endParaRPr lang="de-DE"/>
+          </a:p>
+        </p:txBody>
+      </p:sp>
     </p:spTree>
     <p:extLst>
       <p:ext uri="{BB962C8B-B14F-4D97-AF65-F5344CB8AC3E}">

</xml_diff>